<commit_message>
Add UPS to power slide
</commit_message>
<xml_diff>
--- a/List of Hardware.pptx
+++ b/List of Hardware.pptx
@@ -262,7 +262,7 @@
           <a:p>
             <a:fld id="{4B8A5892-1AA6-4AEE-99E2-59CA45D73674}" type="datetimeFigureOut">
               <a:rPr lang="en-IE" smtClean="0"/>
-              <a:t>22/10/2023</a:t>
+              <a:t>24/10/2023</a:t>
             </a:fld>
             <a:endParaRPr lang="en-IE"/>
           </a:p>
@@ -462,7 +462,7 @@
           <a:p>
             <a:fld id="{4B8A5892-1AA6-4AEE-99E2-59CA45D73674}" type="datetimeFigureOut">
               <a:rPr lang="en-IE" smtClean="0"/>
-              <a:t>22/10/2023</a:t>
+              <a:t>24/10/2023</a:t>
             </a:fld>
             <a:endParaRPr lang="en-IE"/>
           </a:p>
@@ -672,7 +672,7 @@
           <a:p>
             <a:fld id="{4B8A5892-1AA6-4AEE-99E2-59CA45D73674}" type="datetimeFigureOut">
               <a:rPr lang="en-IE" smtClean="0"/>
-              <a:t>22/10/2023</a:t>
+              <a:t>24/10/2023</a:t>
             </a:fld>
             <a:endParaRPr lang="en-IE"/>
           </a:p>
@@ -872,7 +872,7 @@
           <a:p>
             <a:fld id="{4B8A5892-1AA6-4AEE-99E2-59CA45D73674}" type="datetimeFigureOut">
               <a:rPr lang="en-IE" smtClean="0"/>
-              <a:t>22/10/2023</a:t>
+              <a:t>24/10/2023</a:t>
             </a:fld>
             <a:endParaRPr lang="en-IE"/>
           </a:p>
@@ -1148,7 +1148,7 @@
           <a:p>
             <a:fld id="{4B8A5892-1AA6-4AEE-99E2-59CA45D73674}" type="datetimeFigureOut">
               <a:rPr lang="en-IE" smtClean="0"/>
-              <a:t>22/10/2023</a:t>
+              <a:t>24/10/2023</a:t>
             </a:fld>
             <a:endParaRPr lang="en-IE"/>
           </a:p>
@@ -1416,7 +1416,7 @@
           <a:p>
             <a:fld id="{4B8A5892-1AA6-4AEE-99E2-59CA45D73674}" type="datetimeFigureOut">
               <a:rPr lang="en-IE" smtClean="0"/>
-              <a:t>22/10/2023</a:t>
+              <a:t>24/10/2023</a:t>
             </a:fld>
             <a:endParaRPr lang="en-IE"/>
           </a:p>
@@ -1831,7 +1831,7 @@
           <a:p>
             <a:fld id="{4B8A5892-1AA6-4AEE-99E2-59CA45D73674}" type="datetimeFigureOut">
               <a:rPr lang="en-IE" smtClean="0"/>
-              <a:t>22/10/2023</a:t>
+              <a:t>24/10/2023</a:t>
             </a:fld>
             <a:endParaRPr lang="en-IE"/>
           </a:p>
@@ -1973,7 +1973,7 @@
           <a:p>
             <a:fld id="{4B8A5892-1AA6-4AEE-99E2-59CA45D73674}" type="datetimeFigureOut">
               <a:rPr lang="en-IE" smtClean="0"/>
-              <a:t>22/10/2023</a:t>
+              <a:t>24/10/2023</a:t>
             </a:fld>
             <a:endParaRPr lang="en-IE"/>
           </a:p>
@@ -2086,7 +2086,7 @@
           <a:p>
             <a:fld id="{4B8A5892-1AA6-4AEE-99E2-59CA45D73674}" type="datetimeFigureOut">
               <a:rPr lang="en-IE" smtClean="0"/>
-              <a:t>22/10/2023</a:t>
+              <a:t>24/10/2023</a:t>
             </a:fld>
             <a:endParaRPr lang="en-IE"/>
           </a:p>
@@ -2399,7 +2399,7 @@
           <a:p>
             <a:fld id="{4B8A5892-1AA6-4AEE-99E2-59CA45D73674}" type="datetimeFigureOut">
               <a:rPr lang="en-IE" smtClean="0"/>
-              <a:t>22/10/2023</a:t>
+              <a:t>24/10/2023</a:t>
             </a:fld>
             <a:endParaRPr lang="en-IE"/>
           </a:p>
@@ -2688,7 +2688,7 @@
           <a:p>
             <a:fld id="{4B8A5892-1AA6-4AEE-99E2-59CA45D73674}" type="datetimeFigureOut">
               <a:rPr lang="en-IE" smtClean="0"/>
-              <a:t>22/10/2023</a:t>
+              <a:t>24/10/2023</a:t>
             </a:fld>
             <a:endParaRPr lang="en-IE"/>
           </a:p>
@@ -2931,7 +2931,7 @@
           <a:p>
             <a:fld id="{4B8A5892-1AA6-4AEE-99E2-59CA45D73674}" type="datetimeFigureOut">
               <a:rPr lang="en-IE" smtClean="0"/>
-              <a:t>22/10/2023</a:t>
+              <a:t>24/10/2023</a:t>
             </a:fld>
             <a:endParaRPr lang="en-IE"/>
           </a:p>
@@ -3509,7 +3509,13 @@
           <a:p>
             <a:r>
               <a:rPr lang="en-IE" dirty="0"/>
-              <a:t>The device will be plugged into the wall</a:t>
+              <a:t>The device will be plugged into the wall.</a:t>
+            </a:r>
+          </a:p>
+          <a:p>
+            <a:r>
+              <a:rPr lang="en-IE" dirty="0"/>
+              <a:t>The device will use an Uninterruptible Power Supply (UPS) to handle loss of power. This will require 2 rechargeable batteries.</a:t>
             </a:r>
           </a:p>
         </p:txBody>

</xml_diff>

<commit_message>
Add revised fritzing diagram
</commit_message>
<xml_diff>
--- a/List of Hardware.pptx
+++ b/List of Hardware.pptx
@@ -263,7 +263,7 @@
           <a:p>
             <a:fld id="{4B8A5892-1AA6-4AEE-99E2-59CA45D73674}" type="datetimeFigureOut">
               <a:rPr lang="en-IE" smtClean="0"/>
-              <a:t>27/10/2023</a:t>
+              <a:t>29/10/2023</a:t>
             </a:fld>
             <a:endParaRPr lang="en-IE"/>
           </a:p>
@@ -463,7 +463,7 @@
           <a:p>
             <a:fld id="{4B8A5892-1AA6-4AEE-99E2-59CA45D73674}" type="datetimeFigureOut">
               <a:rPr lang="en-IE" smtClean="0"/>
-              <a:t>27/10/2023</a:t>
+              <a:t>29/10/2023</a:t>
             </a:fld>
             <a:endParaRPr lang="en-IE"/>
           </a:p>
@@ -673,7 +673,7 @@
           <a:p>
             <a:fld id="{4B8A5892-1AA6-4AEE-99E2-59CA45D73674}" type="datetimeFigureOut">
               <a:rPr lang="en-IE" smtClean="0"/>
-              <a:t>27/10/2023</a:t>
+              <a:t>29/10/2023</a:t>
             </a:fld>
             <a:endParaRPr lang="en-IE"/>
           </a:p>
@@ -873,7 +873,7 @@
           <a:p>
             <a:fld id="{4B8A5892-1AA6-4AEE-99E2-59CA45D73674}" type="datetimeFigureOut">
               <a:rPr lang="en-IE" smtClean="0"/>
-              <a:t>27/10/2023</a:t>
+              <a:t>29/10/2023</a:t>
             </a:fld>
             <a:endParaRPr lang="en-IE"/>
           </a:p>
@@ -1149,7 +1149,7 @@
           <a:p>
             <a:fld id="{4B8A5892-1AA6-4AEE-99E2-59CA45D73674}" type="datetimeFigureOut">
               <a:rPr lang="en-IE" smtClean="0"/>
-              <a:t>27/10/2023</a:t>
+              <a:t>29/10/2023</a:t>
             </a:fld>
             <a:endParaRPr lang="en-IE"/>
           </a:p>
@@ -1417,7 +1417,7 @@
           <a:p>
             <a:fld id="{4B8A5892-1AA6-4AEE-99E2-59CA45D73674}" type="datetimeFigureOut">
               <a:rPr lang="en-IE" smtClean="0"/>
-              <a:t>27/10/2023</a:t>
+              <a:t>29/10/2023</a:t>
             </a:fld>
             <a:endParaRPr lang="en-IE"/>
           </a:p>
@@ -1832,7 +1832,7 @@
           <a:p>
             <a:fld id="{4B8A5892-1AA6-4AEE-99E2-59CA45D73674}" type="datetimeFigureOut">
               <a:rPr lang="en-IE" smtClean="0"/>
-              <a:t>27/10/2023</a:t>
+              <a:t>29/10/2023</a:t>
             </a:fld>
             <a:endParaRPr lang="en-IE"/>
           </a:p>
@@ -1974,7 +1974,7 @@
           <a:p>
             <a:fld id="{4B8A5892-1AA6-4AEE-99E2-59CA45D73674}" type="datetimeFigureOut">
               <a:rPr lang="en-IE" smtClean="0"/>
-              <a:t>27/10/2023</a:t>
+              <a:t>29/10/2023</a:t>
             </a:fld>
             <a:endParaRPr lang="en-IE"/>
           </a:p>
@@ -2087,7 +2087,7 @@
           <a:p>
             <a:fld id="{4B8A5892-1AA6-4AEE-99E2-59CA45D73674}" type="datetimeFigureOut">
               <a:rPr lang="en-IE" smtClean="0"/>
-              <a:t>27/10/2023</a:t>
+              <a:t>29/10/2023</a:t>
             </a:fld>
             <a:endParaRPr lang="en-IE"/>
           </a:p>
@@ -2400,7 +2400,7 @@
           <a:p>
             <a:fld id="{4B8A5892-1AA6-4AEE-99E2-59CA45D73674}" type="datetimeFigureOut">
               <a:rPr lang="en-IE" smtClean="0"/>
-              <a:t>27/10/2023</a:t>
+              <a:t>29/10/2023</a:t>
             </a:fld>
             <a:endParaRPr lang="en-IE"/>
           </a:p>
@@ -2689,7 +2689,7 @@
           <a:p>
             <a:fld id="{4B8A5892-1AA6-4AEE-99E2-59CA45D73674}" type="datetimeFigureOut">
               <a:rPr lang="en-IE" smtClean="0"/>
-              <a:t>27/10/2023</a:t>
+              <a:t>29/10/2023</a:t>
             </a:fld>
             <a:endParaRPr lang="en-IE"/>
           </a:p>
@@ -2932,7 +2932,7 @@
           <a:p>
             <a:fld id="{4B8A5892-1AA6-4AEE-99E2-59CA45D73674}" type="datetimeFigureOut">
               <a:rPr lang="en-IE" smtClean="0"/>
-              <a:t>27/10/2023</a:t>
+              <a:t>29/10/2023</a:t>
             </a:fld>
             <a:endParaRPr lang="en-IE"/>
           </a:p>
@@ -3489,10 +3489,10 @@
       </p:sp>
       <p:pic>
         <p:nvPicPr>
-          <p:cNvPr id="7" name="Content Placeholder 6" descr="Fritzing Diagram">
-            <a:extLst>
-              <a:ext uri="{FF2B5EF4-FFF2-40B4-BE49-F238E27FC236}">
-                <a16:creationId xmlns:a16="http://schemas.microsoft.com/office/drawing/2014/main" id="{E202F62E-F210-7878-9594-81783510D08D}"/>
+          <p:cNvPr id="6" name="Content Placeholder 5">
+            <a:extLst>
+              <a:ext uri="{FF2B5EF4-FFF2-40B4-BE49-F238E27FC236}">
+                <a16:creationId xmlns:a16="http://schemas.microsoft.com/office/drawing/2014/main" id="{6BE5F963-383F-6584-D05C-BDEB47F1C7C2}"/>
               </a:ext>
             </a:extLst>
           </p:cNvPr>
@@ -3517,8 +3517,8 @@
         </p:blipFill>
         <p:spPr>
           <a:xfrm>
-            <a:off x="2453324" y="2157094"/>
-            <a:ext cx="7285352" cy="3688400"/>
+            <a:off x="1874154" y="1958957"/>
+            <a:ext cx="8443692" cy="4084674"/>
           </a:xfrm>
         </p:spPr>
       </p:pic>

</xml_diff>